<commit_message>
integration commentaires sur pres projet
</commit_message>
<xml_diff>
--- a/projet/Projet Application.pptx
+++ b/projet/Projet Application.pptx
@@ -17,6 +17,7 @@
     <p:sldId id="262" r:id="rId12"/>
     <p:sldId id="263" r:id="rId13"/>
     <p:sldId id="264" r:id="rId14"/>
+    <p:sldId id="265" r:id="rId15"/>
   </p:sldIdLst>
   <p:sldSz cy="5143500" cx="9144000"/>
   <p:notesSz cx="6858000" cy="9144000"/>
@@ -793,6 +794,105 @@
 </p:notes>
 </file>
 
+<file path=ppt/notesSlides/notesSlide10.xml><?xml version="1.0" encoding="utf-8"?>
+<p:notes xmlns:a="http://schemas.openxmlformats.org/drawingml/2006/main" xmlns:r="http://schemas.openxmlformats.org/officeDocument/2006/relationships" xmlns:mc="http://schemas.openxmlformats.org/markup-compatibility/2006" xmlns:mv="urn:schemas-microsoft-com:mac:vml" xmlns:p="http://schemas.openxmlformats.org/presentationml/2006/main" xmlns:c="http://schemas.openxmlformats.org/drawingml/2006/chart" xmlns:dgm="http://schemas.openxmlformats.org/drawingml/2006/diagram" xmlns:o="urn:schemas-microsoft-com:office:office" xmlns:v="urn:schemas-microsoft-com:vml" xmlns:pvml="urn:schemas-microsoft-com:office:powerpoint" xmlns:com="http://schemas.openxmlformats.org/drawingml/2006/compatibility" xmlns:p14="http://schemas.microsoft.com/office/powerpoint/2010/main" xmlns:p15="http://schemas.microsoft.com/office/powerpoint/2012/main" xmlns:ahyp="http://schemas.microsoft.com/office/drawing/2018/hyperlinkcolor" showMasterPhAnim="0" showMasterSp="0">
+  <p:cSld>
+    <p:spTree>
+      <p:nvGrpSpPr>
+        <p:cNvPr id="105" name="Shape 105"/>
+        <p:cNvGrpSpPr/>
+        <p:nvPr/>
+      </p:nvGrpSpPr>
+      <p:grpSpPr>
+        <a:xfrm>
+          <a:off x="0" y="0"/>
+          <a:ext cx="0" cy="0"/>
+          <a:chOff x="0" y="0"/>
+          <a:chExt cx="0" cy="0"/>
+        </a:xfrm>
+      </p:grpSpPr>
+      <p:sp>
+        <p:nvSpPr>
+          <p:cNvPr id="106" name="Google Shape;106;g1e98a00f4ed_5_5:notes"/>
+          <p:cNvSpPr/>
+          <p:nvPr>
+            <p:ph idx="2" type="sldImg"/>
+          </p:nvPr>
+        </p:nvSpPr>
+        <p:spPr>
+          <a:xfrm>
+            <a:off x="381300" y="685800"/>
+            <a:ext cx="6096000" cy="3429000"/>
+          </a:xfrm>
+          <a:custGeom>
+            <a:rect b="b" l="l" r="r" t="t"/>
+            <a:pathLst>
+              <a:path extrusionOk="0" h="120000" w="120000">
+                <a:moveTo>
+                  <a:pt x="0" y="0"/>
+                </a:moveTo>
+                <a:lnTo>
+                  <a:pt x="120000" y="0"/>
+                </a:lnTo>
+                <a:lnTo>
+                  <a:pt x="120000" y="120000"/>
+                </a:lnTo>
+                <a:lnTo>
+                  <a:pt x="0" y="120000"/>
+                </a:lnTo>
+                <a:close/>
+              </a:path>
+            </a:pathLst>
+          </a:custGeom>
+        </p:spPr>
+      </p:sp>
+      <p:sp>
+        <p:nvSpPr>
+          <p:cNvPr id="107" name="Google Shape;107;g1e98a00f4ed_5_5:notes"/>
+          <p:cNvSpPr txBox="1"/>
+          <p:nvPr>
+            <p:ph idx="1" type="body"/>
+          </p:nvPr>
+        </p:nvSpPr>
+        <p:spPr>
+          <a:xfrm>
+            <a:off x="685800" y="4343400"/>
+            <a:ext cx="5486400" cy="4114800"/>
+          </a:xfrm>
+          <a:prstGeom prst="rect">
+            <a:avLst/>
+          </a:prstGeom>
+        </p:spPr>
+        <p:txBody>
+          <a:bodyPr anchorCtr="0" anchor="t" bIns="91425" lIns="91425" spcFirstLastPara="1" rIns="91425" wrap="square" tIns="91425">
+            <a:noAutofit/>
+          </a:bodyPr>
+          <a:lstStyle/>
+          <a:p>
+            <a:pPr indent="0" lvl="0" marL="0" rtl="0" algn="l">
+              <a:spcBef>
+                <a:spcPts val="0"/>
+              </a:spcBef>
+              <a:spcAft>
+                <a:spcPts val="0"/>
+              </a:spcAft>
+              <a:buNone/>
+            </a:pPr>
+            <a:r>
+              <a:t/>
+            </a:r>
+            <a:endParaRPr/>
+          </a:p>
+        </p:txBody>
+      </p:sp>
+    </p:spTree>
+  </p:cSld>
+  <p:clrMapOvr>
+    <a:masterClrMapping/>
+  </p:clrMapOvr>
+</p:notes>
+</file>
+
 <file path=ppt/notesSlides/notesSlide2.xml><?xml version="1.0" encoding="utf-8"?>
 <p:notes xmlns:a="http://schemas.openxmlformats.org/drawingml/2006/main" xmlns:r="http://schemas.openxmlformats.org/officeDocument/2006/relationships" xmlns:mc="http://schemas.openxmlformats.org/markup-compatibility/2006" xmlns:mv="urn:schemas-microsoft-com:mac:vml" xmlns:p="http://schemas.openxmlformats.org/presentationml/2006/main" xmlns:c="http://schemas.openxmlformats.org/drawingml/2006/chart" xmlns:dgm="http://schemas.openxmlformats.org/drawingml/2006/diagram" xmlns:o="urn:schemas-microsoft-com:office:office" xmlns:v="urn:schemas-microsoft-com:vml" xmlns:pvml="urn:schemas-microsoft-com:office:powerpoint" xmlns:com="http://schemas.openxmlformats.org/drawingml/2006/compatibility" xmlns:p14="http://schemas.microsoft.com/office/powerpoint/2010/main" xmlns:p15="http://schemas.microsoft.com/office/powerpoint/2012/main" xmlns:ahyp="http://schemas.microsoft.com/office/drawing/2018/hyperlinkcolor" showMasterPhAnim="0" showMasterSp="0">
   <p:cSld>
@@ -1307,7 +1407,7 @@
       </p:grpSpPr>
       <p:sp>
         <p:nvSpPr>
-          <p:cNvPr id="88" name="Google Shape;88;g1e98a00f4ed_0_20:notes"/>
+          <p:cNvPr id="88" name="Google Shape;88;g1e98a00f4ed_5_26:notes"/>
           <p:cNvSpPr/>
           <p:nvPr>
             <p:ph idx="2" type="sldImg"/>
@@ -1342,7 +1442,7 @@
       </p:sp>
       <p:sp>
         <p:nvSpPr>
-          <p:cNvPr id="89" name="Google Shape;89;g1e98a00f4ed_0_20:notes"/>
+          <p:cNvPr id="89" name="Google Shape;89;g1e98a00f4ed_5_26:notes"/>
           <p:cNvSpPr txBox="1"/>
           <p:nvPr>
             <p:ph idx="1" type="body"/>
@@ -1406,7 +1506,7 @@
       </p:grpSpPr>
       <p:sp>
         <p:nvSpPr>
-          <p:cNvPr id="94" name="Google Shape;94;g1e98a00f4ed_5_0:notes"/>
+          <p:cNvPr id="94" name="Google Shape;94;g1e98a00f4ed_0_20:notes"/>
           <p:cNvSpPr/>
           <p:nvPr>
             <p:ph idx="2" type="sldImg"/>
@@ -1441,7 +1541,7 @@
       </p:sp>
       <p:sp>
         <p:nvSpPr>
-          <p:cNvPr id="95" name="Google Shape;95;g1e98a00f4ed_5_0:notes"/>
+          <p:cNvPr id="95" name="Google Shape;95;g1e98a00f4ed_0_20:notes"/>
           <p:cNvSpPr txBox="1"/>
           <p:nvPr>
             <p:ph idx="1" type="body"/>
@@ -1505,7 +1605,7 @@
       </p:grpSpPr>
       <p:sp>
         <p:nvSpPr>
-          <p:cNvPr id="100" name="Google Shape;100;g1e98a00f4ed_5_5:notes"/>
+          <p:cNvPr id="100" name="Google Shape;100;g1e98a00f4ed_5_0:notes"/>
           <p:cNvSpPr/>
           <p:nvPr>
             <p:ph idx="2" type="sldImg"/>
@@ -1540,7 +1640,7 @@
       </p:sp>
       <p:sp>
         <p:nvSpPr>
-          <p:cNvPr id="101" name="Google Shape;101;g1e98a00f4ed_5_5:notes"/>
+          <p:cNvPr id="101" name="Google Shape;101;g1e98a00f4ed_5_0:notes"/>
           <p:cNvSpPr txBox="1"/>
           <p:nvPr>
             <p:ph idx="1" type="body"/>
@@ -6390,6 +6490,351 @@
 </p:sld>
 </file>
 
+<file path=ppt/slides/slide10.xml><?xml version="1.0" encoding="utf-8"?>
+<p:sld xmlns:a="http://schemas.openxmlformats.org/drawingml/2006/main" xmlns:r="http://schemas.openxmlformats.org/officeDocument/2006/relationships" xmlns:mc="http://schemas.openxmlformats.org/markup-compatibility/2006" xmlns:mv="urn:schemas-microsoft-com:mac:vml" xmlns:p="http://schemas.openxmlformats.org/presentationml/2006/main" xmlns:c="http://schemas.openxmlformats.org/drawingml/2006/chart" xmlns:dgm="http://schemas.openxmlformats.org/drawingml/2006/diagram" xmlns:o="urn:schemas-microsoft-com:office:office" xmlns:v="urn:schemas-microsoft-com:vml" xmlns:pvml="urn:schemas-microsoft-com:office:powerpoint" xmlns:com="http://schemas.openxmlformats.org/drawingml/2006/compatibility" xmlns:p14="http://schemas.microsoft.com/office/powerpoint/2010/main" xmlns:p15="http://schemas.microsoft.com/office/powerpoint/2012/main" xmlns:ahyp="http://schemas.microsoft.com/office/drawing/2018/hyperlinkcolor">
+  <p:cSld>
+    <p:spTree>
+      <p:nvGrpSpPr>
+        <p:cNvPr id="108" name="Shape 108"/>
+        <p:cNvGrpSpPr/>
+        <p:nvPr/>
+      </p:nvGrpSpPr>
+      <p:grpSpPr>
+        <a:xfrm>
+          <a:off x="0" y="0"/>
+          <a:ext cx="0" cy="0"/>
+          <a:chOff x="0" y="0"/>
+          <a:chExt cx="0" cy="0"/>
+        </a:xfrm>
+      </p:grpSpPr>
+      <p:sp>
+        <p:nvSpPr>
+          <p:cNvPr id="109" name="Google Shape;109;p22"/>
+          <p:cNvSpPr txBox="1"/>
+          <p:nvPr>
+            <p:ph type="title"/>
+          </p:nvPr>
+        </p:nvSpPr>
+        <p:spPr>
+          <a:xfrm>
+            <a:off x="311700" y="445025"/>
+            <a:ext cx="8520600" cy="572700"/>
+          </a:xfrm>
+          <a:prstGeom prst="rect">
+            <a:avLst/>
+          </a:prstGeom>
+        </p:spPr>
+        <p:txBody>
+          <a:bodyPr anchorCtr="0" anchor="t" bIns="91425" lIns="91425" spcFirstLastPara="1" rIns="91425" wrap="square" tIns="91425">
+            <a:normAutofit fontScale="90000"/>
+          </a:bodyPr>
+          <a:lstStyle/>
+          <a:p>
+            <a:pPr indent="0" lvl="0" marL="0" rtl="0" algn="l">
+              <a:spcBef>
+                <a:spcPts val="0"/>
+              </a:spcBef>
+              <a:spcAft>
+                <a:spcPts val="0"/>
+              </a:spcAft>
+              <a:buNone/>
+            </a:pPr>
+            <a:r>
+              <a:rPr lang="en"/>
+              <a:t>Fonctionnalités avancées (quand on a le temps)</a:t>
+            </a:r>
+            <a:endParaRPr/>
+          </a:p>
+        </p:txBody>
+      </p:sp>
+      <p:sp>
+        <p:nvSpPr>
+          <p:cNvPr id="110" name="Google Shape;110;p22"/>
+          <p:cNvSpPr txBox="1"/>
+          <p:nvPr>
+            <p:ph idx="1" type="body"/>
+          </p:nvPr>
+        </p:nvSpPr>
+        <p:spPr>
+          <a:xfrm>
+            <a:off x="311700" y="1152475"/>
+            <a:ext cx="8520600" cy="3416400"/>
+          </a:xfrm>
+          <a:prstGeom prst="rect">
+            <a:avLst/>
+          </a:prstGeom>
+        </p:spPr>
+        <p:txBody>
+          <a:bodyPr anchorCtr="0" anchor="t" bIns="91425" lIns="91425" spcFirstLastPara="1" rIns="91425" wrap="square" tIns="91425">
+            <a:noAutofit/>
+          </a:bodyPr>
+          <a:lstStyle/>
+          <a:p>
+            <a:pPr indent="0" lvl="0" marL="0" rtl="0" algn="l">
+              <a:lnSpc>
+                <a:spcPct val="100000"/>
+              </a:lnSpc>
+              <a:spcBef>
+                <a:spcPts val="0"/>
+              </a:spcBef>
+              <a:spcAft>
+                <a:spcPts val="0"/>
+              </a:spcAft>
+              <a:buClr>
+                <a:schemeClr val="dk1"/>
+              </a:buClr>
+              <a:buSzPts val="358"/>
+              <a:buFont typeface="Arial"/>
+              <a:buNone/>
+            </a:pPr>
+            <a:r>
+              <a:rPr lang="en" sz="977"/>
+              <a:t>Gère l’historique des modifications de chaque note</a:t>
+            </a:r>
+            <a:endParaRPr sz="977"/>
+          </a:p>
+          <a:p>
+            <a:pPr indent="0" lvl="0" marL="0" rtl="0" algn="l">
+              <a:lnSpc>
+                <a:spcPct val="100000"/>
+              </a:lnSpc>
+              <a:spcBef>
+                <a:spcPts val="1200"/>
+              </a:spcBef>
+              <a:spcAft>
+                <a:spcPts val="0"/>
+              </a:spcAft>
+              <a:buClr>
+                <a:schemeClr val="dk1"/>
+              </a:buClr>
+              <a:buSzPts val="358"/>
+              <a:buFont typeface="Arial"/>
+              <a:buNone/>
+            </a:pPr>
+            <a:r>
+              <a:rPr lang="en" sz="977"/>
+              <a:t>Facilite l’écriture de textes ou phrases similaires</a:t>
+            </a:r>
+            <a:endParaRPr sz="977"/>
+          </a:p>
+          <a:p>
+            <a:pPr indent="0" lvl="0" marL="0" rtl="0" algn="l">
+              <a:lnSpc>
+                <a:spcPct val="100000"/>
+              </a:lnSpc>
+              <a:spcBef>
+                <a:spcPts val="1200"/>
+              </a:spcBef>
+              <a:spcAft>
+                <a:spcPts val="0"/>
+              </a:spcAft>
+              <a:buClr>
+                <a:schemeClr val="dk1"/>
+              </a:buClr>
+              <a:buSzPts val="358"/>
+              <a:buFont typeface="Arial"/>
+              <a:buNone/>
+            </a:pPr>
+            <a:r>
+              <a:rPr lang="en" sz="977"/>
+              <a:t>Rapports de différents types (“mentionne tel mot tels jours”, nuage de mots, …)</a:t>
+            </a:r>
+            <a:endParaRPr sz="977"/>
+          </a:p>
+          <a:p>
+            <a:pPr indent="0" lvl="0" marL="0" rtl="0" algn="l">
+              <a:lnSpc>
+                <a:spcPct val="100000"/>
+              </a:lnSpc>
+              <a:spcBef>
+                <a:spcPts val="1200"/>
+              </a:spcBef>
+              <a:spcAft>
+                <a:spcPts val="0"/>
+              </a:spcAft>
+              <a:buClr>
+                <a:schemeClr val="dk1"/>
+              </a:buClr>
+              <a:buSzPts val="358"/>
+              <a:buFont typeface="Arial"/>
+              <a:buNone/>
+            </a:pPr>
+            <a:r>
+              <a:rPr lang="en" sz="977"/>
+              <a:t>Mise en forme avec Markdown ou autre</a:t>
+            </a:r>
+            <a:endParaRPr sz="977"/>
+          </a:p>
+          <a:p>
+            <a:pPr indent="0" lvl="0" marL="0" rtl="0" algn="l">
+              <a:lnSpc>
+                <a:spcPct val="100000"/>
+              </a:lnSpc>
+              <a:spcBef>
+                <a:spcPts val="1200"/>
+              </a:spcBef>
+              <a:spcAft>
+                <a:spcPts val="0"/>
+              </a:spcAft>
+              <a:buClr>
+                <a:schemeClr val="dk1"/>
+              </a:buClr>
+              <a:buSzPts val="358"/>
+              <a:buFont typeface="Arial"/>
+              <a:buNone/>
+            </a:pPr>
+            <a:r>
+              <a:rPr lang="en" sz="977"/>
+              <a:t>Monitoring de tendances</a:t>
+            </a:r>
+            <a:endParaRPr sz="977"/>
+          </a:p>
+          <a:p>
+            <a:pPr indent="0" lvl="0" marL="0" rtl="0" algn="l">
+              <a:lnSpc>
+                <a:spcPct val="100000"/>
+              </a:lnSpc>
+              <a:spcBef>
+                <a:spcPts val="1200"/>
+              </a:spcBef>
+              <a:spcAft>
+                <a:spcPts val="0"/>
+              </a:spcAft>
+              <a:buClr>
+                <a:schemeClr val="dk1"/>
+              </a:buClr>
+              <a:buSzPts val="358"/>
+              <a:buFont typeface="Arial"/>
+              <a:buNone/>
+            </a:pPr>
+            <a:r>
+              <a:rPr lang="en" sz="977"/>
+              <a:t>Intégration avec des photos</a:t>
+            </a:r>
+            <a:endParaRPr sz="977"/>
+          </a:p>
+          <a:p>
+            <a:pPr indent="0" lvl="0" marL="0" rtl="0" algn="l">
+              <a:lnSpc>
+                <a:spcPct val="100000"/>
+              </a:lnSpc>
+              <a:spcBef>
+                <a:spcPts val="1200"/>
+              </a:spcBef>
+              <a:spcAft>
+                <a:spcPts val="0"/>
+              </a:spcAft>
+              <a:buClr>
+                <a:schemeClr val="dk1"/>
+              </a:buClr>
+              <a:buSzPts val="358"/>
+              <a:buFont typeface="Arial"/>
+              <a:buNone/>
+            </a:pPr>
+            <a:r>
+              <a:rPr lang="en" sz="977"/>
+              <a:t>Intégration avec données environnementales : localisation, type d’appareil, pouls, vitesse, …</a:t>
+            </a:r>
+            <a:endParaRPr sz="977"/>
+          </a:p>
+          <a:p>
+            <a:pPr indent="0" lvl="0" marL="0" rtl="0" algn="l">
+              <a:lnSpc>
+                <a:spcPct val="100000"/>
+              </a:lnSpc>
+              <a:spcBef>
+                <a:spcPts val="1200"/>
+              </a:spcBef>
+              <a:spcAft>
+                <a:spcPts val="0"/>
+              </a:spcAft>
+              <a:buClr>
+                <a:schemeClr val="dk1"/>
+              </a:buClr>
+              <a:buSzPts val="358"/>
+              <a:buFont typeface="Arial"/>
+              <a:buNone/>
+            </a:pPr>
+            <a:r>
+              <a:rPr lang="en" sz="977"/>
+              <a:t>Sécurité et confidentialité avancées : personne ne peut lire les données sauf l’utilisateur, même pas l’admin !</a:t>
+            </a:r>
+            <a:endParaRPr sz="977"/>
+          </a:p>
+          <a:p>
+            <a:pPr indent="0" lvl="0" marL="0" rtl="0" algn="l">
+              <a:lnSpc>
+                <a:spcPct val="100000"/>
+              </a:lnSpc>
+              <a:spcBef>
+                <a:spcPts val="1200"/>
+              </a:spcBef>
+              <a:spcAft>
+                <a:spcPts val="0"/>
+              </a:spcAft>
+              <a:buClr>
+                <a:schemeClr val="dk1"/>
+              </a:buClr>
+              <a:buSzPts val="358"/>
+              <a:buFont typeface="Arial"/>
+              <a:buNone/>
+            </a:pPr>
+            <a:r>
+              <a:rPr lang="en" sz="977"/>
+              <a:t>Utilisation en groupe : des notes multi-utilisateur partagées par une équipe</a:t>
+            </a:r>
+            <a:endParaRPr sz="977"/>
+          </a:p>
+          <a:p>
+            <a:pPr indent="0" lvl="0" marL="0" rtl="0" algn="l">
+              <a:lnSpc>
+                <a:spcPct val="100000"/>
+              </a:lnSpc>
+              <a:spcBef>
+                <a:spcPts val="1200"/>
+              </a:spcBef>
+              <a:spcAft>
+                <a:spcPts val="0"/>
+              </a:spcAft>
+              <a:buSzPts val="358"/>
+              <a:buNone/>
+            </a:pPr>
+            <a:r>
+              <a:rPr lang="en" sz="977"/>
+              <a:t>IA : résumé de notes, recherche par thème, correction orthographique, prédiction de saisie, traduction…</a:t>
+            </a:r>
+            <a:endParaRPr sz="977"/>
+          </a:p>
+          <a:p>
+            <a:pPr indent="0" lvl="0" marL="0" rtl="0" algn="l">
+              <a:lnSpc>
+                <a:spcPct val="100000"/>
+              </a:lnSpc>
+              <a:spcBef>
+                <a:spcPts val="1200"/>
+              </a:spcBef>
+              <a:spcAft>
+                <a:spcPts val="1200"/>
+              </a:spcAft>
+              <a:buSzPts val="358"/>
+              <a:buNone/>
+            </a:pPr>
+            <a:r>
+              <a:rPr lang="en" sz="977"/>
+              <a:t>Multilingue : comptage de mots en plusieurs langues</a:t>
+            </a:r>
+            <a:endParaRPr sz="977"/>
+          </a:p>
+        </p:txBody>
+      </p:sp>
+    </p:spTree>
+  </p:cSld>
+  <p:clrMapOvr>
+    <a:masterClrMapping/>
+  </p:clrMapOvr>
+</p:sld>
+</file>
+
 <file path=ppt/slides/slide2.xml><?xml version="1.0" encoding="utf-8"?>
 <p:sld xmlns:a="http://schemas.openxmlformats.org/drawingml/2006/main" xmlns:r="http://schemas.openxmlformats.org/officeDocument/2006/relationships" xmlns:mc="http://schemas.openxmlformats.org/markup-compatibility/2006" xmlns:mv="urn:schemas-microsoft-com:mac:vml" xmlns:p="http://schemas.openxmlformats.org/presentationml/2006/main" xmlns:c="http://schemas.openxmlformats.org/drawingml/2006/chart" xmlns:dgm="http://schemas.openxmlformats.org/drawingml/2006/diagram" xmlns:o="urn:schemas-microsoft-com:office:office" xmlns:v="urn:schemas-microsoft-com:vml" xmlns:pvml="urn:schemas-microsoft-com:office:powerpoint" xmlns:com="http://schemas.openxmlformats.org/drawingml/2006/compatibility" xmlns:p14="http://schemas.microsoft.com/office/powerpoint/2010/main" xmlns:p15="http://schemas.microsoft.com/office/powerpoint/2012/main" xmlns:ahyp="http://schemas.microsoft.com/office/drawing/2018/hyperlinkcolor">
   <p:cSld>
@@ -7987,7 +8432,7 @@
             </a:pPr>
             <a:r>
               <a:rPr lang="en"/>
-              <a:t>Fonctionnalités</a:t>
+              <a:t>Concurrence et benchmarking</a:t>
             </a:r>
             <a:endParaRPr/>
           </a:p>
@@ -8016,52 +8461,111 @@
           </a:bodyPr>
           <a:lstStyle/>
           <a:p>
-            <a:pPr indent="-412750" lvl="0" marL="457200" rtl="0" algn="l">
-              <a:spcBef>
-                <a:spcPts val="0"/>
-              </a:spcBef>
-              <a:spcAft>
-                <a:spcPts val="0"/>
-              </a:spcAft>
-              <a:buSzPts val="2900"/>
-              <a:buChar char="●"/>
-            </a:pPr>
-            <a:r>
-              <a:rPr lang="en" sz="3200"/>
-              <a:t>fonctionnalités de base</a:t>
-            </a:r>
-            <a:br>
-              <a:rPr lang="en" sz="2900"/>
-            </a:br>
-            <a:r>
-              <a:rPr lang="en" sz="2600"/>
-              <a:t>qui seront réalisées dans le projet</a:t>
-            </a:r>
-            <a:endParaRPr sz="2600"/>
-          </a:p>
-          <a:p>
-            <a:pPr indent="-412750" lvl="0" marL="457200" rtl="0" algn="l">
-              <a:spcBef>
-                <a:spcPts val="0"/>
-              </a:spcBef>
-              <a:spcAft>
-                <a:spcPts val="0"/>
-              </a:spcAft>
-              <a:buSzPts val="2900"/>
-              <a:buChar char="●"/>
-            </a:pPr>
-            <a:r>
-              <a:rPr lang="en" sz="3200"/>
-              <a:t>fonctionnalités avancées</a:t>
-            </a:r>
-            <a:br>
-              <a:rPr lang="en" sz="2900"/>
-            </a:br>
-            <a:r>
-              <a:rPr lang="en" sz="2700"/>
-              <a:t>qui sont à réaliser un jour quand on aura le temps</a:t>
-            </a:r>
-            <a:endParaRPr sz="2700"/>
+            <a:pPr indent="0" lvl="0" marL="0" rtl="0" algn="l">
+              <a:spcBef>
+                <a:spcPts val="0"/>
+              </a:spcBef>
+              <a:spcAft>
+                <a:spcPts val="0"/>
+              </a:spcAft>
+              <a:buClr>
+                <a:schemeClr val="dk1"/>
+              </a:buClr>
+              <a:buSzPts val="1100"/>
+              <a:buFont typeface="Arial"/>
+              <a:buNone/>
+            </a:pPr>
+            <a:r>
+              <a:rPr lang="en"/>
+              <a:t>Il faudrait 3 exemples, avec logo, avantages, et désavantages</a:t>
+            </a:r>
+            <a:endParaRPr/>
+          </a:p>
+          <a:p>
+            <a:pPr indent="0" lvl="0" marL="0" rtl="0" algn="l">
+              <a:spcBef>
+                <a:spcPts val="1200"/>
+              </a:spcBef>
+              <a:spcAft>
+                <a:spcPts val="0"/>
+              </a:spcAft>
+              <a:buClr>
+                <a:schemeClr val="dk1"/>
+              </a:buClr>
+              <a:buSzPts val="1100"/>
+              <a:buFont typeface="Arial"/>
+              <a:buNone/>
+            </a:pPr>
+            <a:r>
+              <a:rPr lang="en"/>
+              <a:t>Pourrait aussi faire une grille avec concurrents et fonctionnalités et checkmarks</a:t>
+            </a:r>
+            <a:endParaRPr/>
+          </a:p>
+          <a:p>
+            <a:pPr indent="0" lvl="0" marL="0" rtl="0" algn="l">
+              <a:spcBef>
+                <a:spcPts val="1200"/>
+              </a:spcBef>
+              <a:spcAft>
+                <a:spcPts val="0"/>
+              </a:spcAft>
+              <a:buClr>
+                <a:schemeClr val="dk1"/>
+              </a:buClr>
+              <a:buSzPts val="1100"/>
+              <a:buFont typeface="Arial"/>
+              <a:buNone/>
+            </a:pPr>
+            <a:r>
+              <a:t/>
+            </a:r>
+            <a:endParaRPr/>
+          </a:p>
+          <a:p>
+            <a:pPr indent="0" lvl="0" marL="0" rtl="0" algn="l">
+              <a:spcBef>
+                <a:spcPts val="1200"/>
+              </a:spcBef>
+              <a:spcAft>
+                <a:spcPts val="0"/>
+              </a:spcAft>
+              <a:buClr>
+                <a:schemeClr val="dk1"/>
+              </a:buClr>
+              <a:buSzPts val="1100"/>
+              <a:buFont typeface="Arial"/>
+              <a:buNone/>
+            </a:pPr>
+            <a:r>
+              <a:t/>
+            </a:r>
+            <a:endParaRPr/>
+          </a:p>
+          <a:p>
+            <a:pPr indent="0" lvl="0" marL="0" rtl="0" algn="ctr">
+              <a:spcBef>
+                <a:spcPts val="1200"/>
+              </a:spcBef>
+              <a:spcAft>
+                <a:spcPts val="1200"/>
+              </a:spcAft>
+              <a:buClr>
+                <a:schemeClr val="dk1"/>
+              </a:buClr>
+              <a:buSzPts val="1100"/>
+              <a:buFont typeface="Arial"/>
+              <a:buNone/>
+            </a:pPr>
+            <a:r>
+              <a:rPr i="1" lang="en"/>
+              <a:t>à</a:t>
+            </a:r>
+            <a:r>
+              <a:rPr i="1" lang="en"/>
+              <a:t> faire…</a:t>
+            </a:r>
+            <a:endParaRPr i="1"/>
           </a:p>
         </p:txBody>
       </p:sp>
@@ -8124,7 +8628,7 @@
             </a:pPr>
             <a:r>
               <a:rPr lang="en"/>
-              <a:t>Fonctionnalités de base</a:t>
+              <a:t>Fonctionnalités</a:t>
             </a:r>
             <a:endParaRPr/>
           </a:p>
@@ -8149,218 +8653,54 @@
         </p:spPr>
         <p:txBody>
           <a:bodyPr anchorCtr="0" anchor="t" bIns="91425" lIns="91425" spcFirstLastPara="1" rIns="91425" wrap="square" tIns="91425">
-            <a:normAutofit fontScale="47500" lnSpcReduction="20000"/>
+            <a:normAutofit/>
           </a:bodyPr>
           <a:lstStyle/>
           <a:p>
-            <a:pPr indent="0" lvl="0" marL="0" rtl="0" algn="l">
-              <a:spcBef>
-                <a:spcPts val="0"/>
-              </a:spcBef>
-              <a:spcAft>
-                <a:spcPts val="0"/>
-              </a:spcAft>
-              <a:buClr>
-                <a:schemeClr val="dk1"/>
-              </a:buClr>
-              <a:buSzPct val="40740"/>
-              <a:buFont typeface="Arial"/>
-              <a:buNone/>
-            </a:pPr>
+            <a:pPr indent="-412750" lvl="0" marL="457200" rtl="0" algn="l">
+              <a:spcBef>
+                <a:spcPts val="0"/>
+              </a:spcBef>
+              <a:spcAft>
+                <a:spcPts val="0"/>
+              </a:spcAft>
+              <a:buSzPts val="2900"/>
+              <a:buChar char="●"/>
+            </a:pPr>
+            <a:r>
+              <a:rPr lang="en" sz="3200"/>
+              <a:t>fonctionnalités de base</a:t>
+            </a:r>
+            <a:br>
+              <a:rPr lang="en" sz="2900"/>
+            </a:br>
+            <a:r>
+              <a:rPr lang="en" sz="2600"/>
+              <a:t>qui seront réalisées dans le projet</a:t>
+            </a:r>
+            <a:endParaRPr sz="2600"/>
+          </a:p>
+          <a:p>
+            <a:pPr indent="-412750" lvl="0" marL="457200" rtl="0" algn="l">
+              <a:spcBef>
+                <a:spcPts val="0"/>
+              </a:spcBef>
+              <a:spcAft>
+                <a:spcPts val="0"/>
+              </a:spcAft>
+              <a:buSzPts val="2900"/>
+              <a:buChar char="●"/>
+            </a:pPr>
+            <a:r>
+              <a:rPr lang="en" sz="3200"/>
+              <a:t>fonctionnalités avancées</a:t>
+            </a:r>
+            <a:br>
+              <a:rPr lang="en" sz="2900"/>
+            </a:br>
             <a:r>
               <a:rPr lang="en" sz="2700"/>
-              <a:t>Prendre des notes textuelles rapidement</a:t>
-            </a:r>
-            <a:endParaRPr sz="2700"/>
-          </a:p>
-          <a:p>
-            <a:pPr indent="0" lvl="0" marL="0" rtl="0" algn="l">
-              <a:spcBef>
-                <a:spcPts val="1200"/>
-              </a:spcBef>
-              <a:spcAft>
-                <a:spcPts val="0"/>
-              </a:spcAft>
-              <a:buClr>
-                <a:schemeClr val="dk1"/>
-              </a:buClr>
-              <a:buSzPct val="40740"/>
-              <a:buFont typeface="Arial"/>
-              <a:buNone/>
-            </a:pPr>
-            <a:r>
-              <a:rPr lang="en" sz="2700"/>
-              <a:t>Fonctionne sur tous appareils : desktop, mobile, tablette</a:t>
-            </a:r>
-            <a:endParaRPr sz="2700"/>
-          </a:p>
-          <a:p>
-            <a:pPr indent="0" lvl="0" marL="0" rtl="0" algn="l">
-              <a:spcBef>
-                <a:spcPts val="1200"/>
-              </a:spcBef>
-              <a:spcAft>
-                <a:spcPts val="0"/>
-              </a:spcAft>
-              <a:buClr>
-                <a:schemeClr val="dk1"/>
-              </a:buClr>
-              <a:buSzPct val="40740"/>
-              <a:buFont typeface="Arial"/>
-              <a:buNone/>
-            </a:pPr>
-            <a:r>
-              <a:rPr lang="en" sz="2700"/>
-              <a:t>Données enregistrées dans le cloud, accessibles partout à tout moment</a:t>
-            </a:r>
-            <a:endParaRPr sz="2700"/>
-          </a:p>
-          <a:p>
-            <a:pPr indent="0" lvl="0" marL="0" rtl="0" algn="l">
-              <a:spcBef>
-                <a:spcPts val="1200"/>
-              </a:spcBef>
-              <a:spcAft>
-                <a:spcPts val="0"/>
-              </a:spcAft>
-              <a:buClr>
-                <a:schemeClr val="dk1"/>
-              </a:buClr>
-              <a:buSzPct val="40740"/>
-              <a:buFont typeface="Arial"/>
-              <a:buNone/>
-            </a:pPr>
-            <a:r>
-              <a:rPr lang="en" sz="2700"/>
-              <a:t>Organise les notes par date et heure</a:t>
-            </a:r>
-            <a:endParaRPr sz="2700"/>
-          </a:p>
-          <a:p>
-            <a:pPr indent="0" lvl="0" marL="0" rtl="0" algn="l">
-              <a:spcBef>
-                <a:spcPts val="1200"/>
-              </a:spcBef>
-              <a:spcAft>
-                <a:spcPts val="0"/>
-              </a:spcAft>
-              <a:buClr>
-                <a:schemeClr val="dk1"/>
-              </a:buClr>
-              <a:buSzPct val="40740"/>
-              <a:buFont typeface="Arial"/>
-              <a:buNone/>
-            </a:pPr>
-            <a:r>
-              <a:rPr lang="en" sz="2700"/>
-              <a:t>Permet de faire des recherches parmi les notes</a:t>
-            </a:r>
-            <a:endParaRPr sz="2700"/>
-          </a:p>
-          <a:p>
-            <a:pPr indent="0" lvl="0" marL="0" rtl="0" algn="l">
-              <a:spcBef>
-                <a:spcPts val="1200"/>
-              </a:spcBef>
-              <a:spcAft>
-                <a:spcPts val="0"/>
-              </a:spcAft>
-              <a:buClr>
-                <a:schemeClr val="dk1"/>
-              </a:buClr>
-              <a:buSzPct val="40740"/>
-              <a:buFont typeface="Arial"/>
-              <a:buNone/>
-            </a:pPr>
-            <a:r>
-              <a:rPr lang="en" sz="2700"/>
-              <a:t>Publie une note de différentes façons (dans un blog, impression, …)</a:t>
-            </a:r>
-            <a:endParaRPr sz="2700"/>
-          </a:p>
-          <a:p>
-            <a:pPr indent="0" lvl="0" marL="0" rtl="0" algn="l">
-              <a:spcBef>
-                <a:spcPts val="1200"/>
-              </a:spcBef>
-              <a:spcAft>
-                <a:spcPts val="0"/>
-              </a:spcAft>
-              <a:buClr>
-                <a:schemeClr val="dk1"/>
-              </a:buClr>
-              <a:buSzPct val="40740"/>
-              <a:buFont typeface="Arial"/>
-              <a:buNone/>
-            </a:pPr>
-            <a:r>
-              <a:rPr lang="en" sz="2700"/>
-              <a:t>Comptage des mots (“vous avez écrit 752 mots aujourd’hui, 3642 cette semaine, 1 345 862 depuis le début”)</a:t>
-            </a:r>
-            <a:endParaRPr sz="2700"/>
-          </a:p>
-          <a:p>
-            <a:pPr indent="0" lvl="0" marL="0" rtl="0" algn="l">
-              <a:spcBef>
-                <a:spcPts val="1200"/>
-              </a:spcBef>
-              <a:spcAft>
-                <a:spcPts val="0"/>
-              </a:spcAft>
-              <a:buClr>
-                <a:schemeClr val="dk1"/>
-              </a:buClr>
-              <a:buSzPct val="40740"/>
-              <a:buFont typeface="Arial"/>
-              <a:buNone/>
-            </a:pPr>
-            <a:r>
-              <a:rPr lang="en" sz="2700"/>
-              <a:t>Statistiques sur l’activité en fonction du temps (“vous êtes la plus active le mardi”)</a:t>
-            </a:r>
-            <a:endParaRPr sz="2700"/>
-          </a:p>
-          <a:p>
-            <a:pPr indent="0" lvl="0" marL="0" rtl="0" algn="l">
-              <a:spcBef>
-                <a:spcPts val="1200"/>
-              </a:spcBef>
-              <a:spcAft>
-                <a:spcPts val="0"/>
-              </a:spcAft>
-              <a:buClr>
-                <a:schemeClr val="dk1"/>
-              </a:buClr>
-              <a:buSzPct val="40740"/>
-              <a:buFont typeface="Arial"/>
-              <a:buNone/>
-            </a:pPr>
-            <a:r>
-              <a:rPr lang="en" sz="2700"/>
-              <a:t>Sécurité et confidentialité : vos notes ne sont visibles par </a:t>
-            </a:r>
-            <a:r>
-              <a:rPr i="1" lang="en" sz="2700"/>
-              <a:t>personne </a:t>
-            </a:r>
-            <a:r>
-              <a:rPr lang="en" sz="2700"/>
-              <a:t>d’autre, sauf si vous les publiez</a:t>
-            </a:r>
-            <a:endParaRPr sz="2700"/>
-          </a:p>
-          <a:p>
-            <a:pPr indent="0" lvl="0" marL="0" rtl="0" algn="l">
-              <a:spcBef>
-                <a:spcPts val="1200"/>
-              </a:spcBef>
-              <a:spcAft>
-                <a:spcPts val="1200"/>
-              </a:spcAft>
-              <a:buNone/>
-            </a:pPr>
-            <a:r>
-              <a:t/>
+              <a:t>qui sont à réaliser un jour quand on aura le temps</a:t>
             </a:r>
             <a:endParaRPr sz="2700"/>
           </a:p>
@@ -8425,7 +8765,7 @@
             </a:pPr>
             <a:r>
               <a:rPr lang="en"/>
-              <a:t>Fonctionnalités avancées (quand on a le temps)</a:t>
+              <a:t>Fonctionnalités de base</a:t>
             </a:r>
             <a:endParaRPr/>
           </a:p>
@@ -8450,14 +8790,11 @@
         </p:spPr>
         <p:txBody>
           <a:bodyPr anchorCtr="0" anchor="t" bIns="91425" lIns="91425" spcFirstLastPara="1" rIns="91425" wrap="square" tIns="91425">
-            <a:noAutofit/>
+            <a:normAutofit fontScale="32500"/>
           </a:bodyPr>
           <a:lstStyle/>
           <a:p>
             <a:pPr indent="0" lvl="0" marL="0" rtl="0" algn="l">
-              <a:lnSpc>
-                <a:spcPct val="100000"/>
-              </a:lnSpc>
               <a:spcBef>
                 <a:spcPts val="0"/>
               </a:spcBef>
@@ -8467,21 +8804,18 @@
               <a:buClr>
                 <a:schemeClr val="dk1"/>
               </a:buClr>
-              <a:buSzPts val="358"/>
+              <a:buSzPct val="40740"/>
               <a:buFont typeface="Arial"/>
               <a:buNone/>
             </a:pPr>
             <a:r>
-              <a:rPr lang="en" sz="977"/>
-              <a:t>Gère l’historique des modifications de chaque note</a:t>
-            </a:r>
-            <a:endParaRPr sz="977"/>
+              <a:rPr lang="en" sz="2700"/>
+              <a:t>Prendre des notes textuelles rapidement</a:t>
+            </a:r>
+            <a:endParaRPr sz="2700"/>
           </a:p>
           <a:p>
             <a:pPr indent="0" lvl="0" marL="0" rtl="0" algn="l">
-              <a:lnSpc>
-                <a:spcPct val="100000"/>
-              </a:lnSpc>
               <a:spcBef>
                 <a:spcPts val="1200"/>
               </a:spcBef>
@@ -8491,21 +8825,18 @@
               <a:buClr>
                 <a:schemeClr val="dk1"/>
               </a:buClr>
-              <a:buSzPts val="358"/>
+              <a:buSzPct val="40740"/>
               <a:buFont typeface="Arial"/>
               <a:buNone/>
             </a:pPr>
             <a:r>
-              <a:rPr lang="en" sz="977"/>
-              <a:t>Facilite l’écriture de textes ou phrases similaires</a:t>
-            </a:r>
-            <a:endParaRPr sz="977"/>
+              <a:rPr lang="en" sz="2700"/>
+              <a:t>Fonctionne sur tous appareils : desktop, mobile, tablette</a:t>
+            </a:r>
+            <a:endParaRPr sz="2700"/>
           </a:p>
           <a:p>
             <a:pPr indent="0" lvl="0" marL="0" rtl="0" algn="l">
-              <a:lnSpc>
-                <a:spcPct val="100000"/>
-              </a:lnSpc>
               <a:spcBef>
                 <a:spcPts val="1200"/>
               </a:spcBef>
@@ -8515,21 +8846,18 @@
               <a:buClr>
                 <a:schemeClr val="dk1"/>
               </a:buClr>
-              <a:buSzPts val="358"/>
+              <a:buSzPct val="40740"/>
               <a:buFont typeface="Arial"/>
               <a:buNone/>
             </a:pPr>
             <a:r>
-              <a:rPr lang="en" sz="977"/>
-              <a:t>Rapports de différents types (“mentionne tel mot tels jours”, nuage de mots, …)</a:t>
-            </a:r>
-            <a:endParaRPr sz="977"/>
+              <a:rPr lang="en" sz="2700"/>
+              <a:t>Données enregistrées dans le cloud, accessibles partout à tout moment</a:t>
+            </a:r>
+            <a:endParaRPr sz="2700"/>
           </a:p>
           <a:p>
             <a:pPr indent="0" lvl="0" marL="0" rtl="0" algn="l">
-              <a:lnSpc>
-                <a:spcPct val="100000"/>
-              </a:lnSpc>
               <a:spcBef>
                 <a:spcPts val="1200"/>
               </a:spcBef>
@@ -8539,21 +8867,18 @@
               <a:buClr>
                 <a:schemeClr val="dk1"/>
               </a:buClr>
-              <a:buSzPts val="358"/>
+              <a:buSzPct val="40740"/>
               <a:buFont typeface="Arial"/>
               <a:buNone/>
             </a:pPr>
             <a:r>
-              <a:rPr lang="en" sz="977"/>
-              <a:t>Mise en forme avec Markdown ou autre</a:t>
-            </a:r>
-            <a:endParaRPr sz="977"/>
+              <a:rPr lang="en" sz="2700"/>
+              <a:t>Organise les notes par date et heure</a:t>
+            </a:r>
+            <a:endParaRPr sz="2700"/>
           </a:p>
           <a:p>
             <a:pPr indent="0" lvl="0" marL="0" rtl="0" algn="l">
-              <a:lnSpc>
-                <a:spcPct val="100000"/>
-              </a:lnSpc>
               <a:spcBef>
                 <a:spcPts val="1200"/>
               </a:spcBef>
@@ -8563,21 +8888,18 @@
               <a:buClr>
                 <a:schemeClr val="dk1"/>
               </a:buClr>
-              <a:buSzPts val="358"/>
+              <a:buSzPct val="40740"/>
               <a:buFont typeface="Arial"/>
               <a:buNone/>
             </a:pPr>
             <a:r>
-              <a:rPr lang="en" sz="977"/>
-              <a:t>Monitoring de tendances</a:t>
-            </a:r>
-            <a:endParaRPr sz="977"/>
+              <a:rPr lang="en" sz="2700"/>
+              <a:t>Permet de faire des recherches parmi les notes</a:t>
+            </a:r>
+            <a:endParaRPr sz="2700"/>
           </a:p>
           <a:p>
             <a:pPr indent="0" lvl="0" marL="0" rtl="0" algn="l">
-              <a:lnSpc>
-                <a:spcPct val="100000"/>
-              </a:lnSpc>
               <a:spcBef>
                 <a:spcPts val="1200"/>
               </a:spcBef>
@@ -8587,21 +8909,18 @@
               <a:buClr>
                 <a:schemeClr val="dk1"/>
               </a:buClr>
-              <a:buSzPts val="358"/>
+              <a:buSzPct val="40740"/>
               <a:buFont typeface="Arial"/>
               <a:buNone/>
             </a:pPr>
             <a:r>
-              <a:rPr lang="en" sz="977"/>
-              <a:t>Intégration avec des photos</a:t>
-            </a:r>
-            <a:endParaRPr sz="977"/>
+              <a:rPr lang="en" sz="2700"/>
+              <a:t>Publie une note de différentes façons (dans un blog, impression, …)</a:t>
+            </a:r>
+            <a:endParaRPr sz="2700"/>
           </a:p>
           <a:p>
             <a:pPr indent="0" lvl="0" marL="0" rtl="0" algn="l">
-              <a:lnSpc>
-                <a:spcPct val="100000"/>
-              </a:lnSpc>
               <a:spcBef>
                 <a:spcPts val="1200"/>
               </a:spcBef>
@@ -8611,21 +8930,18 @@
               <a:buClr>
                 <a:schemeClr val="dk1"/>
               </a:buClr>
-              <a:buSzPts val="358"/>
+              <a:buSzPct val="40740"/>
               <a:buFont typeface="Arial"/>
               <a:buNone/>
             </a:pPr>
             <a:r>
-              <a:rPr lang="en" sz="977"/>
-              <a:t>Intégration avec données environnementales : localisation, type d’appareil, pouls, vitesse, …</a:t>
-            </a:r>
-            <a:endParaRPr sz="977"/>
+              <a:rPr lang="en" sz="2700"/>
+              <a:t>Comptage des mots (“vous avez écrit 752 mots aujourd’hui, 3642 cette semaine, 1 345 862 depuis le début”)</a:t>
+            </a:r>
+            <a:endParaRPr sz="2700"/>
           </a:p>
           <a:p>
             <a:pPr indent="0" lvl="0" marL="0" rtl="0" algn="l">
-              <a:lnSpc>
-                <a:spcPct val="100000"/>
-              </a:lnSpc>
               <a:spcBef>
                 <a:spcPts val="1200"/>
               </a:spcBef>
@@ -8635,79 +8951,71 @@
               <a:buClr>
                 <a:schemeClr val="dk1"/>
               </a:buClr>
-              <a:buSzPts val="358"/>
+              <a:buSzPct val="40740"/>
               <a:buFont typeface="Arial"/>
               <a:buNone/>
             </a:pPr>
             <a:r>
-              <a:rPr lang="en" sz="977"/>
-              <a:t>Sécurité et confidentialité avancées : personne ne peut lire les données sauf l’utilisateur, même pas l’admin !</a:t>
-            </a:r>
-            <a:endParaRPr sz="977"/>
+              <a:rPr lang="en" sz="2700"/>
+              <a:t>Statistiques sur l’activité en fonction du temps (“vous êtes la plus active le mardi”)</a:t>
+            </a:r>
+            <a:endParaRPr sz="2700"/>
           </a:p>
           <a:p>
             <a:pPr indent="0" lvl="0" marL="0" rtl="0" algn="l">
-              <a:lnSpc>
-                <a:spcPct val="100000"/>
-              </a:lnSpc>
               <a:spcBef>
                 <a:spcPts val="1200"/>
               </a:spcBef>
               <a:spcAft>
                 <a:spcPts val="0"/>
               </a:spcAft>
-              <a:buClr>
-                <a:schemeClr val="dk1"/>
-              </a:buClr>
-              <a:buSzPts val="358"/>
-              <a:buFont typeface="Arial"/>
-              <a:buNone/>
-            </a:pPr>
-            <a:r>
-              <a:rPr lang="en" sz="977"/>
-              <a:t>Utilisation en groupe : des notes multi-utilisateur partagées par une équipe</a:t>
-            </a:r>
-            <a:endParaRPr sz="977"/>
+              <a:buNone/>
+            </a:pPr>
+            <a:r>
+              <a:rPr lang="en" sz="2700"/>
+              <a:t>Sécurité et confidentialité : vos notes ne sont visibles par </a:t>
+            </a:r>
+            <a:r>
+              <a:rPr i="1" lang="en" sz="2700"/>
+              <a:t>personne </a:t>
+            </a:r>
+            <a:r>
+              <a:rPr lang="en" sz="2700"/>
+              <a:t>d’autre, sauf si vous les publiez</a:t>
+            </a:r>
+            <a:endParaRPr sz="2700"/>
           </a:p>
           <a:p>
             <a:pPr indent="0" lvl="0" marL="0" rtl="0" algn="l">
-              <a:lnSpc>
-                <a:spcPct val="100000"/>
-              </a:lnSpc>
               <a:spcBef>
                 <a:spcPts val="1200"/>
               </a:spcBef>
               <a:spcAft>
                 <a:spcPts val="0"/>
               </a:spcAft>
-              <a:buSzPts val="358"/>
-              <a:buNone/>
-            </a:pPr>
-            <a:r>
-              <a:rPr lang="en" sz="977"/>
-              <a:t>IA : résumé de notes, recherche par thème, correction orthographique, prédiction de saisie, traduction…</a:t>
-            </a:r>
-            <a:endParaRPr sz="977"/>
+              <a:buNone/>
+            </a:pPr>
+            <a:r>
+              <a:rPr lang="en" sz="2700"/>
+              <a:t>Fonctionne aussi offline</a:t>
+            </a:r>
+            <a:endParaRPr sz="2700"/>
           </a:p>
           <a:p>
             <a:pPr indent="0" lvl="0" marL="0" rtl="0" algn="l">
-              <a:lnSpc>
-                <a:spcPct val="100000"/>
-              </a:lnSpc>
               <a:spcBef>
                 <a:spcPts val="1200"/>
               </a:spcBef>
               <a:spcAft>
                 <a:spcPts val="1200"/>
               </a:spcAft>
-              <a:buSzPts val="358"/>
-              <a:buNone/>
-            </a:pPr>
-            <a:r>
-              <a:rPr lang="en" sz="977"/>
-              <a:t>Multilingue : comptage de mots en plusieurs langues</a:t>
-            </a:r>
-            <a:endParaRPr sz="977"/>
+              <a:buNone/>
+            </a:pPr>
+            <a:r>
+              <a:rPr lang="en" sz="2700"/>
+              <a:t>Inscription, connexion à détailler</a:t>
+            </a:r>
+            <a:endParaRPr sz="2700"/>
           </a:p>
         </p:txBody>
       </p:sp>

</xml_diff>